<commit_message>
Update documentation based on feedback
</commit_message>
<xml_diff>
--- a/docs/images/HVR_architecture_diagram.pptx
+++ b/docs/images/HVR_architecture_diagram.pptx
@@ -232,7 +232,7 @@
           <a:p>
             <a:fld id="{49A7721D-1176-A640-AC48-B82F78C92D56}" type="datetimeFigureOut">
               <a:rPr lang="en-US" smtClean="0"/>
-              <a:t>7/1/2021</a:t>
+              <a:t>7/14/21</a:t>
             </a:fld>
             <a:endParaRPr lang="en-US" dirty="0"/>
           </a:p>
@@ -409,7 +409,7 @@
           <a:p>
             <a:fld id="{C884A089-FB25-6D46-9D21-F0F04A18BCA8}" type="datetimeFigureOut">
               <a:rPr lang="en-US" smtClean="0"/>
-              <a:t>7/1/2021</a:t>
+              <a:t>7/14/21</a:t>
             </a:fld>
             <a:endParaRPr lang="en-US" dirty="0"/>
           </a:p>
@@ -1872,7 +1872,7 @@
           <a:p>
             <a:fld id="{548045AF-2F23-744F-A16F-4B5C9AF54FA3}" type="datetimeFigureOut">
               <a:rPr lang="en-US" smtClean="0"/>
-              <a:t>7/1/2021</a:t>
+              <a:t>7/14/21</a:t>
             </a:fld>
             <a:endParaRPr lang="en-US" dirty="0"/>
           </a:p>
@@ -2941,40 +2941,13 @@
               <a:defRPr/>
             </a:pPr>
             <a:r>
-              <a:rPr lang="en-US" sz="1200" dirty="0" smtClean="0">
+              <a:rPr lang="en-US" sz="1200" dirty="0">
                 <a:solidFill>
                   <a:srgbClr val="D86613"/>
                 </a:solidFill>
                 <a:cs typeface="Arial" panose="020B0604020202020204" pitchFamily="34" charset="0"/>
               </a:rPr>
-              <a:t>(</a:t>
-            </a:r>
-            <a:r>
-              <a:rPr lang="en-US" sz="1200" dirty="0">
-                <a:solidFill>
-                  <a:srgbClr val="D86613"/>
-                </a:solidFill>
-                <a:cs typeface="Arial" panose="020B0604020202020204" pitchFamily="34" charset="0"/>
-              </a:rPr>
-              <a:t>i</a:t>
-            </a:r>
-            <a:r>
-              <a:rPr lang="en-US" sz="1200" dirty="0" smtClean="0">
-                <a:solidFill>
-                  <a:srgbClr val="D86613"/>
-                </a:solidFill>
-                <a:cs typeface="Arial" panose="020B0604020202020204" pitchFamily="34" charset="0"/>
-              </a:rPr>
-              <a:t>nstance failover</a:t>
-            </a:r>
-            <a:r>
-              <a:rPr lang="en-US" sz="1200" dirty="0">
-                <a:solidFill>
-                  <a:srgbClr val="D86613"/>
-                </a:solidFill>
-                <a:cs typeface="Arial" panose="020B0604020202020204" pitchFamily="34" charset="0"/>
-              </a:rPr>
-              <a:t>)</a:t>
+              <a:t>(instance failover)</a:t>
             </a:r>
           </a:p>
         </p:txBody>
@@ -3185,22 +3158,13 @@
               <a:defRPr/>
             </a:pPr>
             <a:r>
-              <a:rPr lang="en-US" sz="1200" dirty="0" smtClean="0">
+              <a:rPr lang="en-US" sz="1200" dirty="0">
                 <a:solidFill>
                   <a:srgbClr val="D86613"/>
                 </a:solidFill>
                 <a:cs typeface="Arial" panose="020B0604020202020204" pitchFamily="34" charset="0"/>
               </a:rPr>
-              <a:t>Auto </a:t>
-            </a:r>
-            <a:r>
-              <a:rPr lang="en-US" sz="1200" dirty="0">
-                <a:solidFill>
-                  <a:srgbClr val="D86613"/>
-                </a:solidFill>
-                <a:cs typeface="Arial" panose="020B0604020202020204" pitchFamily="34" charset="0"/>
-              </a:rPr>
-              <a:t>Scaling group</a:t>
+              <a:t>Auto Scaling group</a:t>
             </a:r>
           </a:p>
         </p:txBody>
@@ -3220,7 +3184,7 @@
         <p:spPr>
           <a:xfrm>
             <a:off x="2353529" y="2557780"/>
-            <a:ext cx="5655091" cy="3947735"/>
+            <a:ext cx="5655091" cy="1677237"/>
           </a:xfrm>
           <a:prstGeom prst="rect">
             <a:avLst/>
@@ -3486,7 +3450,7 @@
           <a:p>
             <a:pPr algn="ctr" eaLnBrk="1" hangingPunct="1"/>
             <a:r>
-              <a:rPr lang="en-US" altLang="en-US" sz="1200" dirty="0" smtClean="0">
+              <a:rPr lang="en-US" altLang="en-US" sz="1200" dirty="0">
                 <a:latin typeface="+mn-lt"/>
                 <a:ea typeface="Amazon Ember" panose="020B0603020204020204" pitchFamily="34" charset="0"/>
                 <a:cs typeface="Arial" panose="020B0604020202020204" pitchFamily="34" charset="0"/>
@@ -3494,25 +3458,20 @@
               <a:t>HVR</a:t>
             </a:r>
             <a:br>
-              <a:rPr lang="en-US" altLang="en-US" sz="1200" dirty="0" smtClean="0">
+              <a:rPr lang="en-US" altLang="en-US" sz="1200" dirty="0">
                 <a:latin typeface="+mn-lt"/>
                 <a:ea typeface="Amazon Ember" panose="020B0603020204020204" pitchFamily="34" charset="0"/>
                 <a:cs typeface="Arial" panose="020B0604020202020204" pitchFamily="34" charset="0"/>
               </a:rPr>
             </a:br>
             <a:r>
-              <a:rPr lang="en-US" altLang="en-US" sz="1200" dirty="0" smtClean="0">
+              <a:rPr lang="en-US" altLang="en-US" sz="1200" dirty="0">
                 <a:latin typeface="+mn-lt"/>
                 <a:ea typeface="Amazon Ember" panose="020B0603020204020204" pitchFamily="34" charset="0"/>
                 <a:cs typeface="Arial" panose="020B0604020202020204" pitchFamily="34" charset="0"/>
               </a:rPr>
               <a:t>hub</a:t>
             </a:r>
-            <a:endParaRPr lang="en-US" altLang="en-US" sz="1200" dirty="0">
-              <a:latin typeface="+mn-lt"/>
-              <a:ea typeface="Amazon Ember" panose="020B0603020204020204" pitchFamily="34" charset="0"/>
-              <a:cs typeface="Arial" panose="020B0604020202020204" pitchFamily="34" charset="0"/>
-            </a:endParaRPr>
           </a:p>
         </p:txBody>
       </p:sp>
@@ -3818,21 +3777,8 @@
                 <a:ea typeface="Amazon Ember" panose="020B0603020204020204" pitchFamily="34" charset="0"/>
                 <a:cs typeface="Arial" panose="020B0604020202020204" pitchFamily="34" charset="0"/>
               </a:rPr>
-              <a:t>HVR </a:t>
+              <a:t>HVR agent</a:t>
             </a:r>
-            <a:r>
-              <a:rPr lang="en-US" altLang="en-US" sz="1200" dirty="0" smtClean="0">
-                <a:latin typeface="+mn-lt"/>
-                <a:ea typeface="Amazon Ember" panose="020B0603020204020204" pitchFamily="34" charset="0"/>
-                <a:cs typeface="Arial" panose="020B0604020202020204" pitchFamily="34" charset="0"/>
-              </a:rPr>
-              <a:t>agent</a:t>
-            </a:r>
-            <a:endParaRPr lang="en-US" altLang="en-US" sz="1200" dirty="0">
-              <a:latin typeface="+mn-lt"/>
-              <a:ea typeface="Amazon Ember" panose="020B0603020204020204" pitchFamily="34" charset="0"/>
-              <a:cs typeface="Arial" panose="020B0604020202020204" pitchFamily="34" charset="0"/>
-            </a:endParaRPr>
           </a:p>
         </p:txBody>
       </p:sp>
@@ -4052,21 +3998,8 @@
                 <a:ea typeface="Amazon Ember" panose="020B0603020204020204" pitchFamily="34" charset="0"/>
                 <a:cs typeface="Arial" panose="020B0604020202020204" pitchFamily="34" charset="0"/>
               </a:rPr>
-              <a:t>Bastion </a:t>
+              <a:t>Bastion host</a:t>
             </a:r>
-            <a:r>
-              <a:rPr lang="en-US" altLang="en-US" sz="1200" dirty="0" smtClean="0">
-                <a:latin typeface="+mn-lt"/>
-                <a:ea typeface="Amazon Ember" panose="020B0603020204020204" pitchFamily="34" charset="0"/>
-                <a:cs typeface="Arial" panose="020B0604020202020204" pitchFamily="34" charset="0"/>
-              </a:rPr>
-              <a:t>host</a:t>
-            </a:r>
-            <a:endParaRPr lang="en-US" altLang="en-US" sz="1200" dirty="0">
-              <a:latin typeface="+mn-lt"/>
-              <a:ea typeface="Amazon Ember" panose="020B0603020204020204" pitchFamily="34" charset="0"/>
-              <a:cs typeface="Arial" panose="020B0604020202020204" pitchFamily="34" charset="0"/>
-            </a:endParaRPr>
           </a:p>
         </p:txBody>
       </p:sp>
@@ -4422,21 +4355,8 @@
                 <a:ea typeface="Amazon Ember" panose="020B0603020204020204" pitchFamily="34" charset="0"/>
                 <a:cs typeface="Arial" panose="020B0604020202020204" pitchFamily="34" charset="0"/>
               </a:rPr>
-              <a:t>HVR </a:t>
+              <a:t>HVR agent</a:t>
             </a:r>
-            <a:r>
-              <a:rPr lang="en-US" altLang="en-US" sz="1200" dirty="0" smtClean="0">
-                <a:latin typeface="+mn-lt"/>
-                <a:ea typeface="Amazon Ember" panose="020B0603020204020204" pitchFamily="34" charset="0"/>
-                <a:cs typeface="Arial" panose="020B0604020202020204" pitchFamily="34" charset="0"/>
-              </a:rPr>
-              <a:t>agent</a:t>
-            </a:r>
-            <a:endParaRPr lang="en-US" altLang="en-US" sz="1200" dirty="0">
-              <a:latin typeface="+mn-lt"/>
-              <a:ea typeface="Amazon Ember" panose="020B0603020204020204" pitchFamily="34" charset="0"/>
-              <a:cs typeface="Arial" panose="020B0604020202020204" pitchFamily="34" charset="0"/>
-            </a:endParaRPr>
           </a:p>
         </p:txBody>
       </p:sp>
@@ -4814,7 +4734,7 @@
           <a:p>
             <a:pPr algn="ctr" eaLnBrk="1" hangingPunct="1"/>
             <a:r>
-              <a:rPr lang="en-US" altLang="en-US" sz="1200" dirty="0" smtClean="0">
+              <a:rPr lang="en-US" altLang="en-US" sz="1200" dirty="0">
                 <a:latin typeface="+mn-lt"/>
                 <a:ea typeface="Amazon Ember" panose="020B0603020204020204" pitchFamily="34" charset="0"/>
                 <a:cs typeface="Arial" panose="020B0604020202020204" pitchFamily="34" charset="0"/>
@@ -4822,25 +4742,20 @@
               <a:t>HVR</a:t>
             </a:r>
             <a:br>
-              <a:rPr lang="en-US" altLang="en-US" sz="1200" dirty="0" smtClean="0">
+              <a:rPr lang="en-US" altLang="en-US" sz="1200" dirty="0">
                 <a:latin typeface="+mn-lt"/>
                 <a:ea typeface="Amazon Ember" panose="020B0603020204020204" pitchFamily="34" charset="0"/>
                 <a:cs typeface="Arial" panose="020B0604020202020204" pitchFamily="34" charset="0"/>
               </a:rPr>
             </a:br>
             <a:r>
-              <a:rPr lang="en-US" altLang="en-US" sz="1200" dirty="0" smtClean="0">
+              <a:rPr lang="en-US" altLang="en-US" sz="1200" dirty="0">
                 <a:latin typeface="+mn-lt"/>
                 <a:ea typeface="Amazon Ember" panose="020B0603020204020204" pitchFamily="34" charset="0"/>
                 <a:cs typeface="Arial" panose="020B0604020202020204" pitchFamily="34" charset="0"/>
               </a:rPr>
               <a:t>hub</a:t>
             </a:r>
-            <a:endParaRPr lang="en-US" altLang="en-US" sz="1200" dirty="0">
-              <a:latin typeface="+mn-lt"/>
-              <a:ea typeface="Amazon Ember" panose="020B0603020204020204" pitchFamily="34" charset="0"/>
-              <a:cs typeface="Arial" panose="020B0604020202020204" pitchFamily="34" charset="0"/>
-            </a:endParaRPr>
           </a:p>
         </p:txBody>
       </p:sp>
@@ -5378,7 +5293,7 @@
         </p:nvSpPr>
         <p:spPr>
           <a:xfrm>
-            <a:off x="2402421" y="2557991"/>
+            <a:off x="2378320" y="2569901"/>
             <a:ext cx="1430887" cy="276999"/>
           </a:xfrm>
           <a:prstGeom prst="rect">
@@ -5563,34 +5478,21 @@
               </a:rPr>
               <a:t>Bastion </a:t>
             </a:r>
-            <a:r>
-              <a:rPr lang="en-US" altLang="en-US" sz="1200" dirty="0" smtClean="0">
-                <a:latin typeface="+mn-lt"/>
-                <a:ea typeface="Amazon Ember" panose="020B0603020204020204" pitchFamily="34" charset="0"/>
-                <a:cs typeface="Arial" panose="020B0604020202020204" pitchFamily="34" charset="0"/>
-              </a:rPr>
-              <a:t/>
-            </a:r>
             <a:br>
-              <a:rPr lang="en-US" altLang="en-US" sz="1200" dirty="0" smtClean="0">
+              <a:rPr lang="en-US" altLang="en-US" sz="1200" dirty="0">
                 <a:latin typeface="+mn-lt"/>
                 <a:ea typeface="Amazon Ember" panose="020B0603020204020204" pitchFamily="34" charset="0"/>
                 <a:cs typeface="Arial" panose="020B0604020202020204" pitchFamily="34" charset="0"/>
               </a:rPr>
             </a:br>
             <a:r>
-              <a:rPr lang="en-US" altLang="en-US" sz="1200" dirty="0" smtClean="0">
+              <a:rPr lang="en-US" altLang="en-US" sz="1200" dirty="0">
                 <a:latin typeface="+mn-lt"/>
                 <a:ea typeface="Amazon Ember" panose="020B0603020204020204" pitchFamily="34" charset="0"/>
                 <a:cs typeface="Arial" panose="020B0604020202020204" pitchFamily="34" charset="0"/>
               </a:rPr>
               <a:t>host</a:t>
             </a:r>
-            <a:endParaRPr lang="en-US" altLang="en-US" sz="1200" dirty="0">
-              <a:latin typeface="+mn-lt"/>
-              <a:ea typeface="Amazon Ember" panose="020B0603020204020204" pitchFamily="34" charset="0"/>
-              <a:cs typeface="Arial" panose="020B0604020202020204" pitchFamily="34" charset="0"/>
-            </a:endParaRPr>
           </a:p>
         </p:txBody>
       </p:sp>
@@ -5879,23 +5781,7 @@
                 <a:ea typeface="Amazon Ember" panose="020B0603020204020204" pitchFamily="34" charset="0"/>
                 <a:cs typeface="Arial" panose="020B0604020202020204" pitchFamily="34" charset="0"/>
               </a:rPr>
-              <a:t>AWS </a:t>
-            </a:r>
-            <a:r>
-              <a:rPr lang="en-US" altLang="en-US" sz="1200" dirty="0" smtClean="0">
-                <a:latin typeface="+mn-lt"/>
-                <a:ea typeface="Amazon Ember" panose="020B0603020204020204" pitchFamily="34" charset="0"/>
-                <a:cs typeface="Arial" panose="020B0604020202020204" pitchFamily="34" charset="0"/>
-              </a:rPr>
-              <a:t>Secrets </a:t>
-            </a:r>
-            <a:r>
-              <a:rPr lang="en-US" altLang="en-US" sz="1200" dirty="0">
-                <a:latin typeface="+mn-lt"/>
-                <a:ea typeface="Amazon Ember" panose="020B0603020204020204" pitchFamily="34" charset="0"/>
-                <a:cs typeface="Arial" panose="020B0604020202020204" pitchFamily="34" charset="0"/>
-              </a:rPr>
-              <a:t>Manager</a:t>
+              <a:t>AWS Secrets Manager</a:t>
             </a:r>
           </a:p>
         </p:txBody>
@@ -6111,18 +5997,13 @@
           <a:p>
             <a:pPr algn="ctr" eaLnBrk="1" hangingPunct="1"/>
             <a:r>
-              <a:rPr lang="en-US" altLang="en-US" sz="1200" dirty="0" smtClean="0">
+              <a:rPr lang="en-US" altLang="en-US" sz="1200" dirty="0">
                 <a:latin typeface="+mn-lt"/>
                 <a:ea typeface="Amazon Ember" panose="020B0603020204020204" pitchFamily="34" charset="0"/>
                 <a:cs typeface="Arial" panose="020B0604020202020204" pitchFamily="34" charset="0"/>
               </a:rPr>
               <a:t>Amazon SNS</a:t>
             </a:r>
-            <a:endParaRPr lang="en-US" altLang="en-US" sz="1200" dirty="0">
-              <a:latin typeface="+mn-lt"/>
-              <a:ea typeface="Amazon Ember" panose="020B0603020204020204" pitchFamily="34" charset="0"/>
-              <a:cs typeface="Arial" panose="020B0604020202020204" pitchFamily="34" charset="0"/>
-            </a:endParaRPr>
           </a:p>
         </p:txBody>
       </p:sp>
@@ -6524,10 +6405,9 @@
           <a:lstStyle/>
           <a:p>
             <a:r>
-              <a:rPr lang="en-US" sz="1200" dirty="0" smtClean="0"/>
+              <a:rPr lang="en-US" sz="1200" dirty="0"/>
               <a:t>Amazon EFS</a:t>
             </a:r>
-            <a:endParaRPr lang="en-US" sz="1200" dirty="0"/>
           </a:p>
         </p:txBody>
       </p:sp>
@@ -6620,10 +6500,9 @@
           <a:lstStyle/>
           <a:p>
             <a:r>
-              <a:rPr lang="en-US" sz="1200" dirty="0" smtClean="0"/>
+              <a:rPr lang="en-US" sz="1200" dirty="0"/>
               <a:t>Network Load Balancer</a:t>
             </a:r>
-            <a:endParaRPr lang="en-US" sz="1200" dirty="0"/>
           </a:p>
         </p:txBody>
       </p:sp>
@@ -6645,7 +6524,7 @@
           <a:blip r:embed="rId16">
             <a:extLst>
               <a:ext uri="{96DAC541-7B7A-43D3-8B79-37D633B846F1}">
-                <asvg:svgBlip xmlns="" xmlns:asvg="http://schemas.microsoft.com/office/drawing/2016/SVG/main" r:embed="rId30"/>
+                <asvg:svgBlip xmlns:asvg="http://schemas.microsoft.com/office/drawing/2016/SVG/main" r:embed="rId17"/>
               </a:ext>
             </a:extLst>
           </a:blip>
@@ -6774,10 +6653,9 @@
           <a:lstStyle/>
           <a:p>
             <a:r>
-              <a:rPr lang="en-US" sz="1200" dirty="0" smtClean="0"/>
+              <a:rPr lang="en-US" sz="1200" dirty="0"/>
               <a:t>Network Load Balancer</a:t>
             </a:r>
-            <a:endParaRPr lang="en-US" sz="1200" dirty="0"/>
           </a:p>
         </p:txBody>
       </p:sp>
@@ -6870,10 +6748,115 @@
           <a:lstStyle/>
           <a:p>
             <a:r>
-              <a:rPr lang="en-US" sz="1200" dirty="0" smtClean="0"/>
+              <a:rPr lang="en-US" sz="1200" dirty="0"/>
               <a:t>Network Load Balancer</a:t>
             </a:r>
-            <a:endParaRPr lang="en-US" sz="1200" dirty="0"/>
+          </a:p>
+        </p:txBody>
+      </p:sp>
+      <p:sp>
+        <p:nvSpPr>
+          <p:cNvPr id="70" name="Rectangle 69">
+            <a:extLst>
+              <a:ext uri="{FF2B5EF4-FFF2-40B4-BE49-F238E27FC236}">
+                <a16:creationId xmlns:a16="http://schemas.microsoft.com/office/drawing/2014/main" id="{1F7B2887-10ED-834F-BD64-3C6F5DCF6918}"/>
+              </a:ext>
+            </a:extLst>
+          </p:cNvPr>
+          <p:cNvSpPr/>
+          <p:nvPr/>
+        </p:nvSpPr>
+        <p:spPr>
+          <a:xfrm>
+            <a:off x="2350820" y="4332593"/>
+            <a:ext cx="5655091" cy="1272274"/>
+          </a:xfrm>
+          <a:prstGeom prst="rect">
+            <a:avLst/>
+          </a:prstGeom>
+          <a:noFill/>
+          <a:ln w="12700">
+            <a:solidFill>
+              <a:srgbClr val="DF3312"/>
+            </a:solidFill>
+          </a:ln>
+        </p:spPr>
+        <p:style>
+          <a:lnRef idx="2">
+            <a:schemeClr val="accent1">
+              <a:shade val="50000"/>
+            </a:schemeClr>
+          </a:lnRef>
+          <a:fillRef idx="1">
+            <a:schemeClr val="accent1"/>
+          </a:fillRef>
+          <a:effectRef idx="0">
+            <a:schemeClr val="accent1"/>
+          </a:effectRef>
+          <a:fontRef idx="minor">
+            <a:schemeClr val="lt1"/>
+          </a:fontRef>
+        </p:style>
+        <p:txBody>
+          <a:bodyPr tIns="91440" anchorCtr="1"/>
+          <a:lstStyle/>
+          <a:p>
+            <a:pPr eaLnBrk="1" fontAlgn="auto" hangingPunct="1">
+              <a:spcBef>
+                <a:spcPts val="0"/>
+              </a:spcBef>
+              <a:spcAft>
+                <a:spcPts val="0"/>
+              </a:spcAft>
+              <a:defRPr/>
+            </a:pPr>
+            <a:endParaRPr lang="en-US" sz="1200" b="1" dirty="0">
+              <a:solidFill>
+                <a:srgbClr val="DF3312"/>
+              </a:solidFill>
+              <a:cs typeface="Arial" panose="020B0604020202020204" pitchFamily="34" charset="0"/>
+            </a:endParaRPr>
+          </a:p>
+        </p:txBody>
+      </p:sp>
+      <p:sp>
+        <p:nvSpPr>
+          <p:cNvPr id="71" name="TextBox 70">
+            <a:extLst>
+              <a:ext uri="{FF2B5EF4-FFF2-40B4-BE49-F238E27FC236}">
+                <a16:creationId xmlns:a16="http://schemas.microsoft.com/office/drawing/2014/main" id="{2CDC6069-E7F2-EF44-8DA0-528B2C4E2DD9}"/>
+              </a:ext>
+            </a:extLst>
+          </p:cNvPr>
+          <p:cNvSpPr txBox="1"/>
+          <p:nvPr/>
+        </p:nvSpPr>
+        <p:spPr>
+          <a:xfrm>
+            <a:off x="2366558" y="4341841"/>
+            <a:ext cx="1430887" cy="276999"/>
+          </a:xfrm>
+          <a:prstGeom prst="rect">
+            <a:avLst/>
+          </a:prstGeom>
+          <a:noFill/>
+        </p:spPr>
+        <p:txBody>
+          <a:bodyPr wrap="square" rtlCol="0">
+            <a:spAutoFit/>
+          </a:bodyPr>
+          <a:lstStyle/>
+          <a:p>
+            <a:r>
+              <a:rPr lang="en-US" sz="1200" dirty="0">
+                <a:solidFill>
+                  <a:srgbClr val="DF3312"/>
+                </a:solidFill>
+                <a:latin typeface="Arial" panose="020B0604020202020204" pitchFamily="34" charset="0"/>
+                <a:cs typeface="Arial" panose="020B0604020202020204" pitchFamily="34" charset="0"/>
+              </a:rPr>
+              <a:t>Security group</a:t>
+            </a:r>
           </a:p>
         </p:txBody>
       </p:sp>

</xml_diff>